<commit_message>
Edit some font sizing and added animation for the metric score
</commit_message>
<xml_diff>
--- a/presentations/pmReview.pptx
+++ b/presentations/pmReview.pptx
@@ -13172,7 +13172,15 @@
                   <a:srgbClr val="002060"/>
                 </a:solidFill>
               </a:rPr>
-              <a:t> 3</a:t>
+              <a:t> </a:t>
+            </a:r>
+            <a:r>
+              <a:rPr lang="en-SG" sz="2800" b="1" dirty="0" smtClean="0">
+                <a:solidFill>
+                  <a:srgbClr val="002060"/>
+                </a:solidFill>
+              </a:rPr>
+              <a:t>3</a:t>
             </a:r>
           </a:p>
           <a:p>
@@ -17247,6 +17255,70 @@
           </a:prstGeom>
         </p:spPr>
       </p:pic>
+      <p:sp>
+        <p:nvSpPr>
+          <p:cNvPr id="2" name="Rounded Rectangle 1"/>
+          <p:cNvSpPr/>
+          <p:nvPr/>
+        </p:nvSpPr>
+        <p:spPr>
+          <a:xfrm>
+            <a:off x="880110" y="934021"/>
+            <a:ext cx="11311889" cy="755677"/>
+          </a:xfrm>
+          <a:prstGeom prst="roundRect">
+            <a:avLst>
+              <a:gd name="adj" fmla="val 0"/>
+            </a:avLst>
+          </a:prstGeom>
+        </p:spPr>
+        <p:style>
+          <a:lnRef idx="2">
+            <a:schemeClr val="accent1"/>
+          </a:lnRef>
+          <a:fillRef idx="1">
+            <a:schemeClr val="lt1"/>
+          </a:fillRef>
+          <a:effectRef idx="0">
+            <a:schemeClr val="accent1"/>
+          </a:effectRef>
+          <a:fontRef idx="minor">
+            <a:schemeClr val="dk1"/>
+          </a:fontRef>
+        </p:style>
+        <p:txBody>
+          <a:bodyPr rtlCol="0" anchor="ctr"/>
+          <a:lstStyle/>
+          <a:p>
+            <a:pPr algn="ctr"/>
+            <a:r>
+              <a:rPr lang="en-SG" sz="2400" b="1" dirty="0" smtClean="0">
+                <a:solidFill>
+                  <a:schemeClr val="bg2"/>
+                </a:solidFill>
+              </a:rPr>
+              <a:t>Along the path: </a:t>
+            </a:r>
+            <a:r>
+              <a:rPr lang="en-SG" sz="2400" b="1" dirty="0" smtClean="0">
+                <a:solidFill>
+                  <a:schemeClr val="bg2"/>
+                </a:solidFill>
+                <a:sym typeface="Wingdings" panose="05000000000000000000" pitchFamily="2" charset="2"/>
+              </a:rPr>
+              <a:t> </a:t>
+            </a:r>
+            <a:r>
+              <a:rPr lang="en-SG" sz="2400" b="1" dirty="0" smtClean="0">
+                <a:solidFill>
+                  <a:schemeClr val="bg2"/>
+                </a:solidFill>
+              </a:rPr>
+              <a:t>Test Locally &gt;&gt; Integrate &gt;&gt; Deploy &gt;&gt; Regression Testing</a:t>
+            </a:r>
+          </a:p>
+        </p:txBody>
+      </p:sp>
     </p:spTree>
     <p:extLst>
       <p:ext uri="{BB962C8B-B14F-4D97-AF65-F5344CB8AC3E}">
@@ -17263,9 +17335,88 @@
   <p:timing>
     <p:tnLst>
       <p:par>
-        <p:cTn id="1" dur="indefinite" restart="never" nodeType="tmRoot"/>
+        <p:cTn id="1" dur="indefinite" restart="never" nodeType="tmRoot">
+          <p:childTnLst>
+            <p:seq concurrent="1" nextAc="seek">
+              <p:cTn id="2" dur="indefinite" nodeType="mainSeq">
+                <p:childTnLst>
+                  <p:par>
+                    <p:cTn id="3" fill="hold">
+                      <p:stCondLst>
+                        <p:cond delay="indefinite"/>
+                      </p:stCondLst>
+                      <p:childTnLst>
+                        <p:par>
+                          <p:cTn id="4" fill="hold">
+                            <p:stCondLst>
+                              <p:cond delay="0"/>
+                            </p:stCondLst>
+                            <p:childTnLst>
+                              <p:par>
+                                <p:cTn id="5" presetID="10" presetClass="entr" presetSubtype="0" fill="hold" grpId="0" nodeType="clickEffect">
+                                  <p:stCondLst>
+                                    <p:cond delay="0"/>
+                                  </p:stCondLst>
+                                  <p:childTnLst>
+                                    <p:set>
+                                      <p:cBhvr>
+                                        <p:cTn id="6" dur="1" fill="hold">
+                                          <p:stCondLst>
+                                            <p:cond delay="0"/>
+                                          </p:stCondLst>
+                                        </p:cTn>
+                                        <p:tgtEl>
+                                          <p:spTgt spid="2"/>
+                                        </p:tgtEl>
+                                        <p:attrNameLst>
+                                          <p:attrName>style.visibility</p:attrName>
+                                        </p:attrNameLst>
+                                      </p:cBhvr>
+                                      <p:to>
+                                        <p:strVal val="visible"/>
+                                      </p:to>
+                                    </p:set>
+                                    <p:animEffect transition="in" filter="fade">
+                                      <p:cBhvr>
+                                        <p:cTn id="7" dur="500"/>
+                                        <p:tgtEl>
+                                          <p:spTgt spid="2"/>
+                                        </p:tgtEl>
+                                      </p:cBhvr>
+                                    </p:animEffect>
+                                  </p:childTnLst>
+                                </p:cTn>
+                              </p:par>
+                            </p:childTnLst>
+                          </p:cTn>
+                        </p:par>
+                      </p:childTnLst>
+                    </p:cTn>
+                  </p:par>
+                </p:childTnLst>
+              </p:cTn>
+              <p:prevCondLst>
+                <p:cond evt="onPrev" delay="0">
+                  <p:tgtEl>
+                    <p:sldTgt/>
+                  </p:tgtEl>
+                </p:cond>
+              </p:prevCondLst>
+              <p:nextCondLst>
+                <p:cond evt="onNext" delay="0">
+                  <p:tgtEl>
+                    <p:sldTgt/>
+                  </p:tgtEl>
+                </p:cond>
+              </p:nextCondLst>
+            </p:seq>
+          </p:childTnLst>
+        </p:cTn>
       </p:par>
     </p:tnLst>
+    <p:bldLst>
+      <p:bldP spid="2" grpId="0" animBg="1"/>
+    </p:bldLst>
   </p:timing>
 </p:sld>
 </file>
@@ -17755,8 +17906,8 @@
         </p:nvSpPr>
         <p:spPr>
           <a:xfrm>
-            <a:off x="214641" y="1002294"/>
-            <a:ext cx="2018502" cy="1862048"/>
+            <a:off x="179980" y="1554704"/>
+            <a:ext cx="2113079" cy="1200329"/>
           </a:xfrm>
           <a:prstGeom prst="rect">
             <a:avLst/>
@@ -17771,7 +17922,7 @@
           <a:p>
             <a:pPr algn="ctr"/>
             <a:r>
-              <a:rPr lang="en-US" sz="11500" dirty="0" smtClean="0">
+              <a:rPr lang="en-US" sz="7200" dirty="0" smtClean="0">
                 <a:ln w="76200">
                   <a:noFill/>
                 </a:ln>
@@ -17779,10 +17930,10 @@
                   <a:srgbClr val="FF0000"/>
                 </a:solidFill>
               </a:rPr>
-              <a:t>85</a:t>
-            </a:r>
-            <a:r>
-              <a:rPr lang="en-US" sz="2000" b="0" cap="none" spc="0" dirty="0" smtClean="0">
+              <a:t>90.5</a:t>
+            </a:r>
+            <a:r>
+              <a:rPr lang="en-US" sz="1200" b="0" cap="none" spc="0" dirty="0" smtClean="0">
                 <a:ln w="76200">
                   <a:noFill/>
                 </a:ln>
@@ -17793,7 +17944,7 @@
               </a:rPr>
               <a:t>%</a:t>
             </a:r>
-            <a:endParaRPr lang="en-US" sz="2000" b="0" cap="none" spc="0" dirty="0">
+            <a:endParaRPr lang="en-US" sz="1200" b="0" cap="none" spc="0" dirty="0">
               <a:ln w="76200">
                 <a:noFill/>
               </a:ln>
@@ -17880,7 +18031,7 @@
           <p:nvPr>
             <p:extLst>
               <p:ext uri="{D42A27DB-BD31-4B8C-83A1-F6EECF244321}">
-                <p14:modId xmlns:p14="http://schemas.microsoft.com/office/powerpoint/2010/main" val="979401389"/>
+                <p14:modId xmlns:p14="http://schemas.microsoft.com/office/powerpoint/2010/main" val="165693521"/>
               </p:ext>
             </p:extLst>
           </p:nvPr>
@@ -17963,7 +18114,7 @@
                     <a:p>
                       <a:r>
                         <a:rPr lang="en-SG" b="1" dirty="0" smtClean="0"/>
-                        <a:t>Not important.</a:t>
+                        <a:t>Not important</a:t>
                       </a:r>
                       <a:r>
                         <a:rPr lang="en-SG" b="1" baseline="0" dirty="0" smtClean="0"/>
@@ -18313,9 +18464,88 @@
   <p:timing>
     <p:tnLst>
       <p:par>
-        <p:cTn id="1" dur="indefinite" restart="never" nodeType="tmRoot"/>
+        <p:cTn id="1" dur="indefinite" restart="never" nodeType="tmRoot">
+          <p:childTnLst>
+            <p:seq concurrent="1" nextAc="seek">
+              <p:cTn id="2" dur="indefinite" nodeType="mainSeq">
+                <p:childTnLst>
+                  <p:par>
+                    <p:cTn id="3" fill="hold">
+                      <p:stCondLst>
+                        <p:cond delay="indefinite"/>
+                      </p:stCondLst>
+                      <p:childTnLst>
+                        <p:par>
+                          <p:cTn id="4" fill="hold">
+                            <p:stCondLst>
+                              <p:cond delay="0"/>
+                            </p:stCondLst>
+                            <p:childTnLst>
+                              <p:par>
+                                <p:cTn id="5" presetID="10" presetClass="entr" presetSubtype="0" fill="hold" grpId="0" nodeType="clickEffect">
+                                  <p:stCondLst>
+                                    <p:cond delay="0"/>
+                                  </p:stCondLst>
+                                  <p:childTnLst>
+                                    <p:set>
+                                      <p:cBhvr>
+                                        <p:cTn id="6" dur="1" fill="hold">
+                                          <p:stCondLst>
+                                            <p:cond delay="0"/>
+                                          </p:stCondLst>
+                                        </p:cTn>
+                                        <p:tgtEl>
+                                          <p:spTgt spid="20"/>
+                                        </p:tgtEl>
+                                        <p:attrNameLst>
+                                          <p:attrName>style.visibility</p:attrName>
+                                        </p:attrNameLst>
+                                      </p:cBhvr>
+                                      <p:to>
+                                        <p:strVal val="visible"/>
+                                      </p:to>
+                                    </p:set>
+                                    <p:animEffect transition="in" filter="fade">
+                                      <p:cBhvr>
+                                        <p:cTn id="7" dur="500"/>
+                                        <p:tgtEl>
+                                          <p:spTgt spid="20"/>
+                                        </p:tgtEl>
+                                      </p:cBhvr>
+                                    </p:animEffect>
+                                  </p:childTnLst>
+                                </p:cTn>
+                              </p:par>
+                            </p:childTnLst>
+                          </p:cTn>
+                        </p:par>
+                      </p:childTnLst>
+                    </p:cTn>
+                  </p:par>
+                </p:childTnLst>
+              </p:cTn>
+              <p:prevCondLst>
+                <p:cond evt="onPrev" delay="0">
+                  <p:tgtEl>
+                    <p:sldTgt/>
+                  </p:tgtEl>
+                </p:cond>
+              </p:prevCondLst>
+              <p:nextCondLst>
+                <p:cond evt="onNext" delay="0">
+                  <p:tgtEl>
+                    <p:sldTgt/>
+                  </p:tgtEl>
+                </p:cond>
+              </p:nextCondLst>
+            </p:seq>
+          </p:childTnLst>
+        </p:cTn>
       </p:par>
     </p:tnLst>
+    <p:bldLst>
+      <p:bldP spid="20" grpId="0"/>
+    </p:bldLst>
   </p:timing>
 </p:sld>
 </file>

</xml_diff>